<commit_message>
week 7: updated slides
</commit_message>
<xml_diff>
--- a/week_07/slides/rbp_workshop_07.pptx
+++ b/week_07/slides/rbp_workshop_07.pptx
@@ -5,7 +5,7 @@
     <p:sldMasterId id="2147483648" r:id="rId1"/>
   </p:sldMasterIdLst>
   <p:notesMasterIdLst>
-    <p:notesMasterId r:id="rId9"/>
+    <p:notesMasterId r:id="rId10"/>
   </p:notesMasterIdLst>
   <p:sldIdLst>
     <p:sldId id="1778" r:id="rId2"/>
@@ -14,7 +14,8 @@
     <p:sldId id="1789" r:id="rId5"/>
     <p:sldId id="1801" r:id="rId6"/>
     <p:sldId id="1803" r:id="rId7"/>
-    <p:sldId id="1738" r:id="rId8"/>
+    <p:sldId id="1804" r:id="rId8"/>
+    <p:sldId id="1738" r:id="rId9"/>
   </p:sldIdLst>
   <p:sldSz cx="12192000" cy="6858000"/>
   <p:notesSz cx="6858000" cy="9144000"/>
@@ -30599,7 +30600,7 @@
           <a:p>
             <a:fld id="{890BA6AD-6D87-42F0-880A-0024A766D576}" type="datetimeFigureOut">
               <a:rPr lang="en-US" smtClean="0"/>
-              <a:t>11/21/22</a:t>
+              <a:t>11/22/22</a:t>
             </a:fld>
             <a:endParaRPr lang="en-US"/>
           </a:p>
@@ -31636,6 +31637,120 @@
             <a:fld id="{1526202F-DEF9-4191-8752-62497FCB2E3D}" type="slidenum">
               <a:rPr lang="en-US" smtClean="0"/>
               <a:t>7</a:t>
+            </a:fld>
+            <a:endParaRPr lang="en-US"/>
+          </a:p>
+        </p:txBody>
+      </p:sp>
+    </p:spTree>
+    <p:extLst>
+      <p:ext uri="{BB962C8B-B14F-4D97-AF65-F5344CB8AC3E}">
+        <p14:creationId xmlns:p14="http://schemas.microsoft.com/office/powerpoint/2010/main" val="1532357834"/>
+      </p:ext>
+    </p:extLst>
+  </p:cSld>
+  <p:clrMapOvr>
+    <a:masterClrMapping/>
+  </p:clrMapOvr>
+</p:notes>
+</file>
+
+<file path=ppt/notesSlides/notesSlide8.xml><?xml version="1.0" encoding="utf-8"?>
+<p:notes xmlns:a="http://schemas.openxmlformats.org/drawingml/2006/main" xmlns:r="http://schemas.openxmlformats.org/officeDocument/2006/relationships" xmlns:p="http://schemas.openxmlformats.org/presentationml/2006/main">
+  <p:cSld>
+    <p:spTree>
+      <p:nvGrpSpPr>
+        <p:cNvPr id="1" name=""/>
+        <p:cNvGrpSpPr/>
+        <p:nvPr/>
+      </p:nvGrpSpPr>
+      <p:grpSpPr>
+        <a:xfrm>
+          <a:off x="0" y="0"/>
+          <a:ext cx="0" cy="0"/>
+          <a:chOff x="0" y="0"/>
+          <a:chExt cx="0" cy="0"/>
+        </a:xfrm>
+      </p:grpSpPr>
+      <p:sp>
+        <p:nvSpPr>
+          <p:cNvPr id="2" name="Slide Image Placeholder 1"/>
+          <p:cNvSpPr>
+            <a:spLocks noGrp="1" noRot="1" noChangeAspect="1"/>
+          </p:cNvSpPr>
+          <p:nvPr>
+            <p:ph type="sldImg"/>
+          </p:nvPr>
+        </p:nvSpPr>
+        <p:spPr>
+          <a:xfrm>
+            <a:off x="381000" y="685800"/>
+            <a:ext cx="6096000" cy="3429000"/>
+          </a:xfrm>
+        </p:spPr>
+      </p:sp>
+      <p:sp>
+        <p:nvSpPr>
+          <p:cNvPr id="3" name="Notes Placeholder 2"/>
+          <p:cNvSpPr>
+            <a:spLocks noGrp="1"/>
+          </p:cNvSpPr>
+          <p:nvPr>
+            <p:ph type="body" idx="1"/>
+          </p:nvPr>
+        </p:nvSpPr>
+        <p:spPr/>
+        <p:txBody>
+          <a:bodyPr/>
+          <a:lstStyle/>
+          <a:p>
+            <a:pPr marL="0" marR="0" lvl="0" indent="0" algn="l" defTabSz="914400" rtl="0" eaLnBrk="1" fontAlgn="auto" latinLnBrk="0" hangingPunct="1">
+              <a:lnSpc>
+                <a:spcPct val="100000"/>
+              </a:lnSpc>
+              <a:spcBef>
+                <a:spcPts val="0"/>
+              </a:spcBef>
+              <a:spcAft>
+                <a:spcPts val="0"/>
+              </a:spcAft>
+              <a:buClrTx/>
+              <a:buSzTx/>
+              <a:buFontTx/>
+              <a:buNone/>
+              <a:tabLst/>
+              <a:defRPr/>
+            </a:pPr>
+            <a:endParaRPr lang="en-US" dirty="0">
+              <a:solidFill>
+                <a:srgbClr val="17161C"/>
+              </a:solidFill>
+              <a:latin typeface="Avenir Next" panose="020B0503020202020204" pitchFamily="34" charset="0"/>
+              <a:ea typeface="Nunito"/>
+              <a:cs typeface="Nunito"/>
+              <a:sym typeface="Nunito"/>
+            </a:endParaRPr>
+          </a:p>
+        </p:txBody>
+      </p:sp>
+      <p:sp>
+        <p:nvSpPr>
+          <p:cNvPr id="4" name="Slide Number Placeholder 3"/>
+          <p:cNvSpPr>
+            <a:spLocks noGrp="1"/>
+          </p:cNvSpPr>
+          <p:nvPr>
+            <p:ph type="sldNum" sz="quarter" idx="5"/>
+          </p:nvPr>
+        </p:nvSpPr>
+        <p:spPr/>
+        <p:txBody>
+          <a:bodyPr/>
+          <a:lstStyle/>
+          <a:p>
+            <a:fld id="{1526202F-DEF9-4191-8752-62497FCB2E3D}" type="slidenum">
+              <a:rPr lang="en-US" smtClean="0"/>
+              <a:t>8</a:t>
             </a:fld>
             <a:endParaRPr lang="en-US"/>
           </a:p>
@@ -36681,6 +36796,577 @@
         <p:spPr>
           <a:xfrm>
             <a:off x="355478" y="128981"/>
+            <a:ext cx="2776273" cy="954107"/>
+          </a:xfrm>
+          <a:prstGeom prst="rect">
+            <a:avLst/>
+          </a:prstGeom>
+          <a:noFill/>
+        </p:spPr>
+        <p:txBody>
+          <a:bodyPr wrap="none">
+            <a:spAutoFit/>
+          </a:bodyPr>
+          <a:lstStyle/>
+          <a:p>
+            <a:r>
+              <a:rPr lang="en" sz="2800" dirty="0">
+                <a:solidFill>
+                  <a:schemeClr val="tx1"/>
+                </a:solidFill>
+              </a:rPr>
+              <a:t>📣 </a:t>
+            </a:r>
+            <a:r>
+              <a:rPr lang="en" sz="2800" b="1" dirty="0">
+                <a:solidFill>
+                  <a:schemeClr val="tx1"/>
+                </a:solidFill>
+                <a:latin typeface="Avenir Next" panose="020B0503020202020204" pitchFamily="34" charset="0"/>
+              </a:rPr>
+              <a:t>NEXT STEP !</a:t>
+            </a:r>
+            <a:endParaRPr lang="en" sz="2800" b="1" kern="0" dirty="0">
+              <a:solidFill>
+                <a:schemeClr val="tx1"/>
+              </a:solidFill>
+              <a:latin typeface="Avenir Next" panose="020B0503020202020204" pitchFamily="34" charset="0"/>
+            </a:endParaRPr>
+          </a:p>
+          <a:p>
+            <a:endParaRPr lang="en-US" sz="2800" b="1" dirty="0">
+              <a:latin typeface="Avenir Next" panose="020B0503020202020204" pitchFamily="34" charset="0"/>
+            </a:endParaRPr>
+          </a:p>
+        </p:txBody>
+      </p:sp>
+      <p:cxnSp>
+        <p:nvCxnSpPr>
+          <p:cNvPr id="19" name="Straight Connector 18">
+            <a:extLst>
+              <a:ext uri="{FF2B5EF4-FFF2-40B4-BE49-F238E27FC236}">
+                <a16:creationId xmlns:a16="http://schemas.microsoft.com/office/drawing/2014/main" id="{4E164C12-8D72-C646-8A66-672962BDEA7F}"/>
+              </a:ext>
+            </a:extLst>
+          </p:cNvPr>
+          <p:cNvCxnSpPr>
+            <a:cxnSpLocks/>
+          </p:cNvCxnSpPr>
+          <p:nvPr/>
+        </p:nvCxnSpPr>
+        <p:spPr>
+          <a:xfrm>
+            <a:off x="2449279" y="647537"/>
+            <a:ext cx="0" cy="1374640"/>
+          </a:xfrm>
+          <a:prstGeom prst="line">
+            <a:avLst/>
+          </a:prstGeom>
+          <a:ln w="57150"/>
+        </p:spPr>
+        <p:style>
+          <a:lnRef idx="1">
+            <a:schemeClr val="accent1"/>
+          </a:lnRef>
+          <a:fillRef idx="0">
+            <a:schemeClr val="accent1"/>
+          </a:fillRef>
+          <a:effectRef idx="0">
+            <a:schemeClr val="accent1"/>
+          </a:effectRef>
+          <a:fontRef idx="minor">
+            <a:schemeClr val="tx1"/>
+          </a:fontRef>
+        </p:style>
+      </p:cxnSp>
+      <p:cxnSp>
+        <p:nvCxnSpPr>
+          <p:cNvPr id="20" name="Straight Connector 19">
+            <a:extLst>
+              <a:ext uri="{FF2B5EF4-FFF2-40B4-BE49-F238E27FC236}">
+                <a16:creationId xmlns:a16="http://schemas.microsoft.com/office/drawing/2014/main" id="{569A8522-0B45-0F4C-A168-C4190196D811}"/>
+              </a:ext>
+            </a:extLst>
+          </p:cNvPr>
+          <p:cNvCxnSpPr>
+            <a:cxnSpLocks/>
+          </p:cNvCxnSpPr>
+          <p:nvPr/>
+        </p:nvCxnSpPr>
+        <p:spPr>
+          <a:xfrm>
+            <a:off x="2449279" y="6325077"/>
+            <a:ext cx="0" cy="520430"/>
+          </a:xfrm>
+          <a:prstGeom prst="line">
+            <a:avLst/>
+          </a:prstGeom>
+          <a:ln w="57150"/>
+        </p:spPr>
+        <p:style>
+          <a:lnRef idx="1">
+            <a:schemeClr val="accent1"/>
+          </a:lnRef>
+          <a:fillRef idx="0">
+            <a:schemeClr val="accent1"/>
+          </a:fillRef>
+          <a:effectRef idx="0">
+            <a:schemeClr val="accent1"/>
+          </a:effectRef>
+          <a:fontRef idx="minor">
+            <a:schemeClr val="tx1"/>
+          </a:fontRef>
+        </p:style>
+      </p:cxnSp>
+      <p:sp>
+        <p:nvSpPr>
+          <p:cNvPr id="24" name="TextBox 23">
+            <a:extLst>
+              <a:ext uri="{FF2B5EF4-FFF2-40B4-BE49-F238E27FC236}">
+                <a16:creationId xmlns:a16="http://schemas.microsoft.com/office/drawing/2014/main" id="{D35BDF4B-9554-1143-B6FA-769721EEE41D}"/>
+              </a:ext>
+            </a:extLst>
+          </p:cNvPr>
+          <p:cNvSpPr txBox="1"/>
+          <p:nvPr/>
+        </p:nvSpPr>
+        <p:spPr>
+          <a:xfrm>
+            <a:off x="5148287" y="4169495"/>
+            <a:ext cx="11514400" cy="2062103"/>
+          </a:xfrm>
+          <a:prstGeom prst="rect">
+            <a:avLst/>
+          </a:prstGeom>
+          <a:noFill/>
+        </p:spPr>
+        <p:txBody>
+          <a:bodyPr wrap="square" rtlCol="0">
+            <a:spAutoFit/>
+          </a:bodyPr>
+          <a:lstStyle/>
+          <a:p>
+            <a:endParaRPr lang="en-CH" sz="3200" dirty="0">
+              <a:latin typeface="Calibri" panose="020F0502020204030204" pitchFamily="34" charset="0"/>
+              <a:cs typeface="Calibri" panose="020F0502020204030204" pitchFamily="34" charset="0"/>
+            </a:endParaRPr>
+          </a:p>
+          <a:p>
+            <a:pPr marL="457189" indent="-457189">
+              <a:buFont typeface="Arial" panose="020B0604020202020204" pitchFamily="34" charset="0"/>
+              <a:buChar char="•"/>
+            </a:pPr>
+            <a:r>
+              <a:rPr lang="en-US" sz="3200" dirty="0">
+                <a:latin typeface="Calibri" panose="020F0502020204030204" pitchFamily="34" charset="0"/>
+                <a:cs typeface="Calibri" panose="020F0502020204030204" pitchFamily="34" charset="0"/>
+              </a:rPr>
+              <a:t>Learning to code plots! </a:t>
+            </a:r>
+          </a:p>
+          <a:p>
+            <a:pPr marL="457189" indent="-457189">
+              <a:buFont typeface="Arial" panose="020B0604020202020204" pitchFamily="34" charset="0"/>
+              <a:buChar char="•"/>
+            </a:pPr>
+            <a:r>
+              <a:rPr lang="en-US" sz="3200" dirty="0">
+                <a:latin typeface="Calibri" panose="020F0502020204030204" pitchFamily="34" charset="0"/>
+                <a:cs typeface="Calibri" panose="020F0502020204030204" pitchFamily="34" charset="0"/>
+              </a:rPr>
+              <a:t>You become </a:t>
+            </a:r>
+            <a:r>
+              <a:rPr lang="en-US" sz="3200" dirty="0" err="1">
+                <a:latin typeface="Calibri" panose="020F0502020204030204" pitchFamily="34" charset="0"/>
+                <a:cs typeface="Calibri" panose="020F0502020204030204" pitchFamily="34" charset="0"/>
+              </a:rPr>
+              <a:t>Esquisser</a:t>
+            </a:r>
+            <a:r>
+              <a:rPr lang="en-US" sz="3200" dirty="0">
+                <a:latin typeface="Calibri" panose="020F0502020204030204" pitchFamily="34" charset="0"/>
+                <a:cs typeface="Calibri" panose="020F0502020204030204" pitchFamily="34" charset="0"/>
+              </a:rPr>
+              <a:t> ++++</a:t>
+            </a:r>
+          </a:p>
+          <a:p>
+            <a:pPr marL="457189" indent="-457189">
+              <a:buFont typeface="Arial" panose="020B0604020202020204" pitchFamily="34" charset="0"/>
+              <a:buChar char="•"/>
+            </a:pPr>
+            <a:r>
+              <a:rPr lang="en-US" sz="3200" dirty="0">
+                <a:latin typeface="Calibri" panose="020F0502020204030204" pitchFamily="34" charset="0"/>
+                <a:cs typeface="Calibri" panose="020F0502020204030204" pitchFamily="34" charset="0"/>
+              </a:rPr>
+              <a:t>With Joy </a:t>
+            </a:r>
+            <a:r>
+              <a:rPr lang="en-US" sz="3200" dirty="0" err="1">
+                <a:latin typeface="Calibri" panose="020F0502020204030204" pitchFamily="34" charset="0"/>
+                <a:cs typeface="Calibri" panose="020F0502020204030204" pitchFamily="34" charset="0"/>
+              </a:rPr>
+              <a:t>Vaz</a:t>
+            </a:r>
+            <a:endParaRPr lang="en-CH" sz="2800" dirty="0">
+              <a:latin typeface="Calibri" panose="020F0502020204030204" pitchFamily="34" charset="0"/>
+              <a:cs typeface="Calibri" panose="020F0502020204030204" pitchFamily="34" charset="0"/>
+            </a:endParaRPr>
+          </a:p>
+        </p:txBody>
+      </p:sp>
+      <p:pic>
+        <p:nvPicPr>
+          <p:cNvPr id="3" name="Picture 2">
+            <a:extLst>
+              <a:ext uri="{FF2B5EF4-FFF2-40B4-BE49-F238E27FC236}">
+                <a16:creationId xmlns:a16="http://schemas.microsoft.com/office/drawing/2014/main" id="{EC65F20E-3AB0-FA4E-AEC2-0F8C478A7219}"/>
+              </a:ext>
+            </a:extLst>
+          </p:cNvPr>
+          <p:cNvPicPr>
+            <a:picLocks noChangeAspect="1"/>
+          </p:cNvPicPr>
+          <p:nvPr/>
+        </p:nvPicPr>
+        <p:blipFill>
+          <a:blip r:embed="rId3">
+            <a:extLst>
+              <a:ext uri="{28A0092B-C50C-407E-A947-70E740481C1C}">
+                <a14:useLocalDpi xmlns:a14="http://schemas.microsoft.com/office/drawing/2010/main" val="0"/>
+              </a:ext>
+            </a:extLst>
+          </a:blip>
+          <a:stretch>
+            <a:fillRect/>
+          </a:stretch>
+        </p:blipFill>
+        <p:spPr>
+          <a:xfrm>
+            <a:off x="652843" y="2099795"/>
+            <a:ext cx="3592872" cy="4131803"/>
+          </a:xfrm>
+          <a:prstGeom prst="rect">
+            <a:avLst/>
+          </a:prstGeom>
+        </p:spPr>
+      </p:pic>
+      <p:pic>
+        <p:nvPicPr>
+          <p:cNvPr id="5" name="Picture 4">
+            <a:extLst>
+              <a:ext uri="{FF2B5EF4-FFF2-40B4-BE49-F238E27FC236}">
+                <a16:creationId xmlns:a16="http://schemas.microsoft.com/office/drawing/2014/main" id="{A3025C85-AC40-8A41-8E85-66B10BDCD859}"/>
+              </a:ext>
+            </a:extLst>
+          </p:cNvPr>
+          <p:cNvPicPr>
+            <a:picLocks noChangeAspect="1"/>
+          </p:cNvPicPr>
+          <p:nvPr/>
+        </p:nvPicPr>
+        <p:blipFill>
+          <a:blip r:embed="rId4">
+            <a:extLst>
+              <a:ext uri="{28A0092B-C50C-407E-A947-70E740481C1C}">
+                <a14:useLocalDpi xmlns:a14="http://schemas.microsoft.com/office/drawing/2010/main" val="0"/>
+              </a:ext>
+            </a:extLst>
+          </a:blip>
+          <a:stretch>
+            <a:fillRect/>
+          </a:stretch>
+        </p:blipFill>
+        <p:spPr>
+          <a:xfrm>
+            <a:off x="5747598" y="760315"/>
+            <a:ext cx="3592872" cy="3606638"/>
+          </a:xfrm>
+          <a:prstGeom prst="rect">
+            <a:avLst/>
+          </a:prstGeom>
+          <a:ln>
+            <a:noFill/>
+          </a:ln>
+          <a:effectLst>
+            <a:outerShdw blurRad="292100" dist="139700" dir="2700000" algn="tl" rotWithShape="0">
+              <a:srgbClr val="333333">
+                <a:alpha val="65000"/>
+              </a:srgbClr>
+            </a:outerShdw>
+          </a:effectLst>
+        </p:spPr>
+      </p:pic>
+    </p:spTree>
+    <p:extLst>
+      <p:ext uri="{BB962C8B-B14F-4D97-AF65-F5344CB8AC3E}">
+        <p14:creationId xmlns:p14="http://schemas.microsoft.com/office/powerpoint/2010/main" val="466700271"/>
+      </p:ext>
+    </p:extLst>
+  </p:cSld>
+  <p:clrMapOvr>
+    <a:masterClrMapping/>
+  </p:clrMapOvr>
+  <p:timing>
+    <p:tnLst>
+      <p:par>
+        <p:cTn id="1" dur="indefinite" restart="never" nodeType="tmRoot">
+          <p:childTnLst>
+            <p:seq concurrent="1" nextAc="seek">
+              <p:cTn id="2" dur="indefinite" nodeType="mainSeq">
+                <p:childTnLst>
+                  <p:par>
+                    <p:cTn id="3" fill="hold">
+                      <p:stCondLst>
+                        <p:cond delay="indefinite"/>
+                      </p:stCondLst>
+                      <p:childTnLst>
+                        <p:par>
+                          <p:cTn id="4" fill="hold">
+                            <p:stCondLst>
+                              <p:cond delay="0"/>
+                            </p:stCondLst>
+                            <p:childTnLst>
+                              <p:par>
+                                <p:cTn id="5" presetID="1" presetClass="entr" presetSubtype="0" fill="hold" grpId="0" nodeType="clickEffect">
+                                  <p:stCondLst>
+                                    <p:cond delay="0"/>
+                                  </p:stCondLst>
+                                  <p:childTnLst>
+                                    <p:set>
+                                      <p:cBhvr>
+                                        <p:cTn id="6" dur="1" fill="hold">
+                                          <p:stCondLst>
+                                            <p:cond delay="0"/>
+                                          </p:stCondLst>
+                                        </p:cTn>
+                                        <p:tgtEl>
+                                          <p:spTgt spid="24">
+                                            <p:txEl>
+                                              <p:pRg st="1" end="1"/>
+                                            </p:txEl>
+                                          </p:spTgt>
+                                        </p:tgtEl>
+                                        <p:attrNameLst>
+                                          <p:attrName>style.visibility</p:attrName>
+                                        </p:attrNameLst>
+                                      </p:cBhvr>
+                                      <p:to>
+                                        <p:strVal val="visible"/>
+                                      </p:to>
+                                    </p:set>
+                                  </p:childTnLst>
+                                </p:cTn>
+                              </p:par>
+                            </p:childTnLst>
+                          </p:cTn>
+                        </p:par>
+                      </p:childTnLst>
+                    </p:cTn>
+                  </p:par>
+                  <p:par>
+                    <p:cTn id="7" fill="hold">
+                      <p:stCondLst>
+                        <p:cond delay="indefinite"/>
+                      </p:stCondLst>
+                      <p:childTnLst>
+                        <p:par>
+                          <p:cTn id="8" fill="hold">
+                            <p:stCondLst>
+                              <p:cond delay="0"/>
+                            </p:stCondLst>
+                            <p:childTnLst>
+                              <p:par>
+                                <p:cTn id="9" presetID="1" presetClass="entr" presetSubtype="0" fill="hold" grpId="0" nodeType="clickEffect">
+                                  <p:stCondLst>
+                                    <p:cond delay="0"/>
+                                  </p:stCondLst>
+                                  <p:childTnLst>
+                                    <p:set>
+                                      <p:cBhvr>
+                                        <p:cTn id="10" dur="1" fill="hold">
+                                          <p:stCondLst>
+                                            <p:cond delay="0"/>
+                                          </p:stCondLst>
+                                        </p:cTn>
+                                        <p:tgtEl>
+                                          <p:spTgt spid="24">
+                                            <p:txEl>
+                                              <p:pRg st="2" end="2"/>
+                                            </p:txEl>
+                                          </p:spTgt>
+                                        </p:tgtEl>
+                                        <p:attrNameLst>
+                                          <p:attrName>style.visibility</p:attrName>
+                                        </p:attrNameLst>
+                                      </p:cBhvr>
+                                      <p:to>
+                                        <p:strVal val="visible"/>
+                                      </p:to>
+                                    </p:set>
+                                  </p:childTnLst>
+                                </p:cTn>
+                              </p:par>
+                            </p:childTnLst>
+                          </p:cTn>
+                        </p:par>
+                      </p:childTnLst>
+                    </p:cTn>
+                  </p:par>
+                  <p:par>
+                    <p:cTn id="11" fill="hold">
+                      <p:stCondLst>
+                        <p:cond delay="indefinite"/>
+                      </p:stCondLst>
+                      <p:childTnLst>
+                        <p:par>
+                          <p:cTn id="12" fill="hold">
+                            <p:stCondLst>
+                              <p:cond delay="0"/>
+                            </p:stCondLst>
+                            <p:childTnLst>
+                              <p:par>
+                                <p:cTn id="13" presetID="1" presetClass="entr" presetSubtype="0" fill="hold" grpId="0" nodeType="clickEffect">
+                                  <p:stCondLst>
+                                    <p:cond delay="0"/>
+                                  </p:stCondLst>
+                                  <p:childTnLst>
+                                    <p:set>
+                                      <p:cBhvr>
+                                        <p:cTn id="14" dur="1" fill="hold">
+                                          <p:stCondLst>
+                                            <p:cond delay="0"/>
+                                          </p:stCondLst>
+                                        </p:cTn>
+                                        <p:tgtEl>
+                                          <p:spTgt spid="24">
+                                            <p:txEl>
+                                              <p:pRg st="3" end="3"/>
+                                            </p:txEl>
+                                          </p:spTgt>
+                                        </p:tgtEl>
+                                        <p:attrNameLst>
+                                          <p:attrName>style.visibility</p:attrName>
+                                        </p:attrNameLst>
+                                      </p:cBhvr>
+                                      <p:to>
+                                        <p:strVal val="visible"/>
+                                      </p:to>
+                                    </p:set>
+                                  </p:childTnLst>
+                                </p:cTn>
+                              </p:par>
+                            </p:childTnLst>
+                          </p:cTn>
+                        </p:par>
+                      </p:childTnLst>
+                    </p:cTn>
+                  </p:par>
+                </p:childTnLst>
+              </p:cTn>
+              <p:prevCondLst>
+                <p:cond evt="onPrev" delay="0">
+                  <p:tgtEl>
+                    <p:sldTgt/>
+                  </p:tgtEl>
+                </p:cond>
+              </p:prevCondLst>
+              <p:nextCondLst>
+                <p:cond evt="onNext" delay="0">
+                  <p:tgtEl>
+                    <p:sldTgt/>
+                  </p:tgtEl>
+                </p:cond>
+              </p:nextCondLst>
+            </p:seq>
+          </p:childTnLst>
+        </p:cTn>
+      </p:par>
+    </p:tnLst>
+    <p:bldLst>
+      <p:bldP spid="24" grpId="0" uiExpand="1" build="p"/>
+    </p:bldLst>
+  </p:timing>
+</p:sld>
+</file>
+
+<file path=ppt/slides/slide8.xml><?xml version="1.0" encoding="utf-8"?>
+<p:sld xmlns:a="http://schemas.openxmlformats.org/drawingml/2006/main" xmlns:r="http://schemas.openxmlformats.org/officeDocument/2006/relationships" xmlns:p="http://schemas.openxmlformats.org/presentationml/2006/main">
+  <p:cSld>
+    <p:spTree>
+      <p:nvGrpSpPr>
+        <p:cNvPr id="1" name=""/>
+        <p:cNvGrpSpPr/>
+        <p:nvPr/>
+      </p:nvGrpSpPr>
+      <p:grpSpPr>
+        <a:xfrm>
+          <a:off x="0" y="0"/>
+          <a:ext cx="0" cy="0"/>
+          <a:chOff x="0" y="0"/>
+          <a:chExt cx="0" cy="0"/>
+        </a:xfrm>
+      </p:grpSpPr>
+      <p:cxnSp>
+        <p:nvCxnSpPr>
+          <p:cNvPr id="43" name="Straight Connector 42">
+            <a:extLst>
+              <a:ext uri="{FF2B5EF4-FFF2-40B4-BE49-F238E27FC236}">
+                <a16:creationId xmlns:a16="http://schemas.microsoft.com/office/drawing/2014/main" id="{3A5077C6-7E4F-2F4E-BD92-B687C1BB85ED}"/>
+              </a:ext>
+            </a:extLst>
+          </p:cNvPr>
+          <p:cNvCxnSpPr>
+            <a:cxnSpLocks/>
+          </p:cNvCxnSpPr>
+          <p:nvPr/>
+        </p:nvCxnSpPr>
+        <p:spPr>
+          <a:xfrm>
+            <a:off x="479419" y="647537"/>
+            <a:ext cx="744431" cy="0"/>
+          </a:xfrm>
+          <a:prstGeom prst="line">
+            <a:avLst/>
+          </a:prstGeom>
+          <a:ln w="38100">
+            <a:solidFill>
+              <a:srgbClr val="57A7B1"/>
+            </a:solidFill>
+          </a:ln>
+        </p:spPr>
+        <p:style>
+          <a:lnRef idx="1">
+            <a:schemeClr val="accent1"/>
+          </a:lnRef>
+          <a:fillRef idx="0">
+            <a:schemeClr val="accent1"/>
+          </a:fillRef>
+          <a:effectRef idx="0">
+            <a:schemeClr val="accent1"/>
+          </a:effectRef>
+          <a:fontRef idx="minor">
+            <a:schemeClr val="tx1"/>
+          </a:fontRef>
+        </p:style>
+      </p:cxnSp>
+      <p:sp>
+        <p:nvSpPr>
+          <p:cNvPr id="44" name="TextBox 43">
+            <a:extLst>
+              <a:ext uri="{FF2B5EF4-FFF2-40B4-BE49-F238E27FC236}">
+                <a16:creationId xmlns:a16="http://schemas.microsoft.com/office/drawing/2014/main" id="{BFA7D6A8-F365-734B-A552-638838DBD786}"/>
+              </a:ext>
+            </a:extLst>
+          </p:cNvPr>
+          <p:cNvSpPr txBox="1"/>
+          <p:nvPr/>
+        </p:nvSpPr>
+        <p:spPr>
+          <a:xfrm>
+            <a:off x="355478" y="128981"/>
             <a:ext cx="3781741" cy="523220"/>
           </a:xfrm>
           <a:prstGeom prst="rect">

</xml_diff>